<commit_message>
Primer Versión de la presentación comercial
</commit_message>
<xml_diff>
--- a/Documentacion/Documentos de Gestión/Presentación comercial/PowerPoint/White Powder.pptx
+++ b/Documentacion/Documentos de Gestión/Presentación comercial/PowerPoint/White Powder.pptx
@@ -13,6 +13,8 @@
     <p:sldId id="261" r:id="rId7"/>
     <p:sldId id="262" r:id="rId8"/>
     <p:sldId id="263" r:id="rId9"/>
+    <p:sldId id="265" r:id="rId10"/>
+    <p:sldId id="264" r:id="rId11"/>
   </p:sldIdLst>
   <p:sldSz cx="12192000" cy="6858000"/>
   <p:notesSz cx="6858000" cy="9144000"/>
@@ -622,7 +624,7 @@
             <a:fld id="{B61BEF0D-F0BB-DE4B-95CE-6DB70DBA9567}" type="datetimeFigureOut">
               <a:rPr lang="en-US" dirty="0"/>
               <a:pPr/>
-              <a:t>8/23/2014</a:t>
+              <a:t>8/24/2014</a:t>
             </a:fld>
             <a:endParaRPr lang="en-US" dirty="0"/>
           </a:p>
@@ -922,7 +924,7 @@
             <a:fld id="{B61BEF0D-F0BB-DE4B-95CE-6DB70DBA9567}" type="datetimeFigureOut">
               <a:rPr lang="en-US" dirty="0"/>
               <a:pPr/>
-              <a:t>8/23/2014</a:t>
+              <a:t>8/24/2014</a:t>
             </a:fld>
             <a:endParaRPr lang="en-US" dirty="0"/>
           </a:p>
@@ -1167,7 +1169,7 @@
             <a:fld id="{B61BEF0D-F0BB-DE4B-95CE-6DB70DBA9567}" type="datetimeFigureOut">
               <a:rPr lang="en-US" dirty="0"/>
               <a:pPr/>
-              <a:t>8/23/2014</a:t>
+              <a:t>8/24/2014</a:t>
             </a:fld>
             <a:endParaRPr lang="en-US" dirty="0"/>
           </a:p>
@@ -1704,7 +1706,7 @@
             <a:fld id="{B61BEF0D-F0BB-DE4B-95CE-6DB70DBA9567}" type="datetimeFigureOut">
               <a:rPr lang="en-US" dirty="0"/>
               <a:pPr/>
-              <a:t>8/23/2014</a:t>
+              <a:t>8/24/2014</a:t>
             </a:fld>
             <a:endParaRPr lang="en-US" dirty="0"/>
           </a:p>
@@ -1949,7 +1951,7 @@
             <a:fld id="{B61BEF0D-F0BB-DE4B-95CE-6DB70DBA9567}" type="datetimeFigureOut">
               <a:rPr lang="en-US" dirty="0"/>
               <a:pPr/>
-              <a:t>8/23/2014</a:t>
+              <a:t>8/24/2014</a:t>
             </a:fld>
             <a:endParaRPr lang="en-US" dirty="0"/>
           </a:p>
@@ -2478,7 +2480,7 @@
             <a:fld id="{B61BEF0D-F0BB-DE4B-95CE-6DB70DBA9567}" type="datetimeFigureOut">
               <a:rPr lang="en-US" dirty="0"/>
               <a:pPr/>
-              <a:t>8/23/2014</a:t>
+              <a:t>8/24/2014</a:t>
             </a:fld>
             <a:endParaRPr lang="en-US" dirty="0"/>
           </a:p>
@@ -2772,7 +2774,7 @@
             <a:fld id="{B61BEF0D-F0BB-DE4B-95CE-6DB70DBA9567}" type="datetimeFigureOut">
               <a:rPr lang="en-US" dirty="0"/>
               <a:pPr/>
-              <a:t>8/23/2014</a:t>
+              <a:t>8/24/2014</a:t>
             </a:fld>
             <a:endParaRPr lang="en-US" dirty="0"/>
           </a:p>
@@ -2943,7 +2945,7 @@
             <a:fld id="{B61BEF0D-F0BB-DE4B-95CE-6DB70DBA9567}" type="datetimeFigureOut">
               <a:rPr lang="en-US" dirty="0"/>
               <a:pPr/>
-              <a:t>8/23/2014</a:t>
+              <a:t>8/24/2014</a:t>
             </a:fld>
             <a:endParaRPr lang="en-US" dirty="0"/>
           </a:p>
@@ -3120,7 +3122,7 @@
             <a:fld id="{B61BEF0D-F0BB-DE4B-95CE-6DB70DBA9567}" type="datetimeFigureOut">
               <a:rPr lang="en-US" dirty="0"/>
               <a:pPr/>
-              <a:t>8/23/2014</a:t>
+              <a:t>8/24/2014</a:t>
             </a:fld>
             <a:endParaRPr lang="en-US" dirty="0"/>
           </a:p>
@@ -3292,7 +3294,7 @@
             <a:fld id="{B61BEF0D-F0BB-DE4B-95CE-6DB70DBA9567}" type="datetimeFigureOut">
               <a:rPr lang="en-US" dirty="0"/>
               <a:pPr/>
-              <a:t>8/23/2014</a:t>
+              <a:t>8/24/2014</a:t>
             </a:fld>
             <a:endParaRPr lang="en-US" dirty="0"/>
           </a:p>
@@ -3547,7 +3549,7 @@
             <a:fld id="{B61BEF0D-F0BB-DE4B-95CE-6DB70DBA9567}" type="datetimeFigureOut">
               <a:rPr lang="en-US" dirty="0"/>
               <a:pPr/>
-              <a:t>8/23/2014</a:t>
+              <a:t>8/24/2014</a:t>
             </a:fld>
             <a:endParaRPr lang="en-US" dirty="0"/>
           </a:p>
@@ -3848,7 +3850,7 @@
             <a:fld id="{B61BEF0D-F0BB-DE4B-95CE-6DB70DBA9567}" type="datetimeFigureOut">
               <a:rPr lang="en-US" dirty="0"/>
               <a:pPr/>
-              <a:t>8/23/2014</a:t>
+              <a:t>8/24/2014</a:t>
             </a:fld>
             <a:endParaRPr lang="en-US" dirty="0"/>
           </a:p>
@@ -4294,7 +4296,7 @@
             <a:fld id="{B61BEF0D-F0BB-DE4B-95CE-6DB70DBA9567}" type="datetimeFigureOut">
               <a:rPr lang="en-US" dirty="0"/>
               <a:pPr/>
-              <a:t>8/23/2014</a:t>
+              <a:t>8/24/2014</a:t>
             </a:fld>
             <a:endParaRPr lang="en-US" dirty="0"/>
           </a:p>
@@ -4416,7 +4418,7 @@
             <a:fld id="{B61BEF0D-F0BB-DE4B-95CE-6DB70DBA9567}" type="datetimeFigureOut">
               <a:rPr lang="en-US" dirty="0"/>
               <a:pPr/>
-              <a:t>8/23/2014</a:t>
+              <a:t>8/24/2014</a:t>
             </a:fld>
             <a:endParaRPr lang="en-US" dirty="0"/>
           </a:p>
@@ -4515,7 +4517,7 @@
             <a:fld id="{B61BEF0D-F0BB-DE4B-95CE-6DB70DBA9567}" type="datetimeFigureOut">
               <a:rPr lang="en-US" dirty="0"/>
               <a:pPr/>
-              <a:t>8/23/2014</a:t>
+              <a:t>8/24/2014</a:t>
             </a:fld>
             <a:endParaRPr lang="en-US" dirty="0"/>
           </a:p>
@@ -4802,7 +4804,7 @@
             <a:fld id="{B61BEF0D-F0BB-DE4B-95CE-6DB70DBA9567}" type="datetimeFigureOut">
               <a:rPr lang="en-US" dirty="0"/>
               <a:pPr/>
-              <a:t>8/23/2014</a:t>
+              <a:t>8/24/2014</a:t>
             </a:fld>
             <a:endParaRPr lang="en-US" dirty="0"/>
           </a:p>
@@ -5090,7 +5092,7 @@
             <a:fld id="{B61BEF0D-F0BB-DE4B-95CE-6DB70DBA9567}" type="datetimeFigureOut">
               <a:rPr lang="en-US" dirty="0"/>
               <a:pPr/>
-              <a:t>8/23/2014</a:t>
+              <a:t>8/24/2014</a:t>
             </a:fld>
             <a:endParaRPr lang="en-US" dirty="0"/>
           </a:p>
@@ -5617,7 +5619,7 @@
             <a:fld id="{B61BEF0D-F0BB-DE4B-95CE-6DB70DBA9567}" type="datetimeFigureOut">
               <a:rPr lang="en-US" dirty="0"/>
               <a:pPr/>
-              <a:t>8/23/2014</a:t>
+              <a:t>8/24/2014</a:t>
             </a:fld>
             <a:endParaRPr lang="en-US" dirty="0"/>
           </a:p>
@@ -6348,6 +6350,67 @@
 </p:sld>
 </file>
 
+<file path=ppt/slides/slide10.xml><?xml version="1.0" encoding="utf-8"?>
+<p:sld xmlns:a="http://schemas.openxmlformats.org/drawingml/2006/main" xmlns:r="http://schemas.openxmlformats.org/officeDocument/2006/relationships" xmlns:p="http://schemas.openxmlformats.org/presentationml/2006/main">
+  <p:cSld>
+    <p:spTree>
+      <p:nvGrpSpPr>
+        <p:cNvPr id="1" name=""/>
+        <p:cNvGrpSpPr/>
+        <p:nvPr/>
+      </p:nvGrpSpPr>
+      <p:grpSpPr>
+        <a:xfrm>
+          <a:off x="0" y="0"/>
+          <a:ext cx="0" cy="0"/>
+          <a:chOff x="0" y="0"/>
+          <a:chExt cx="0" cy="0"/>
+        </a:xfrm>
+      </p:grpSpPr>
+      <p:pic>
+        <p:nvPicPr>
+          <p:cNvPr id="4" name="Imagen 3"/>
+          <p:cNvPicPr>
+            <a:picLocks noChangeAspect="1"/>
+          </p:cNvPicPr>
+          <p:nvPr/>
+        </p:nvPicPr>
+        <p:blipFill>
+          <a:blip r:embed="rId2">
+            <a:extLst>
+              <a:ext uri="{28A0092B-C50C-407E-A947-70E740481C1C}">
+                <a14:useLocalDpi xmlns:a14="http://schemas.microsoft.com/office/drawing/2010/main" val="0"/>
+              </a:ext>
+            </a:extLst>
+          </a:blip>
+          <a:stretch>
+            <a:fillRect/>
+          </a:stretch>
+        </p:blipFill>
+        <p:spPr>
+          <a:xfrm>
+            <a:off x="3657600" y="990600"/>
+            <a:ext cx="4876800" cy="4876800"/>
+          </a:xfrm>
+          <a:prstGeom prst="rect">
+            <a:avLst/>
+          </a:prstGeom>
+          <a:noFill/>
+        </p:spPr>
+      </p:pic>
+    </p:spTree>
+    <p:extLst>
+      <p:ext uri="{BB962C8B-B14F-4D97-AF65-F5344CB8AC3E}">
+        <p14:creationId xmlns:p14="http://schemas.microsoft.com/office/powerpoint/2010/main" val="567796723"/>
+      </p:ext>
+    </p:extLst>
+  </p:cSld>
+  <p:clrMapOvr>
+    <a:masterClrMapping/>
+  </p:clrMapOvr>
+</p:sld>
+</file>
+
 <file path=ppt/slides/slide2.xml><?xml version="1.0" encoding="utf-8"?>
 <p:sld xmlns:a="http://schemas.openxmlformats.org/drawingml/2006/main" xmlns:r="http://schemas.openxmlformats.org/officeDocument/2006/relationships" xmlns:p="http://schemas.openxmlformats.org/presentationml/2006/main">
   <p:cSld>
@@ -7372,7 +7435,7 @@
           <p:nvPr/>
         </p:nvPicPr>
         <p:blipFill>
-          <a:blip r:embed="rId2">
+          <a:blip r:embed="rId3">
             <a:extLst>
               <a:ext uri="{28A0092B-C50C-407E-A947-70E740481C1C}">
                 <a14:useLocalDpi xmlns:a14="http://schemas.microsoft.com/office/drawing/2010/main" val="0"/>
@@ -7386,7 +7449,7 @@
         <p:spPr>
           <a:xfrm>
             <a:off x="8264308" y="2385612"/>
-            <a:ext cx="325641" cy="329926"/>
+            <a:ext cx="325641" cy="329925"/>
           </a:xfrm>
           <a:prstGeom prst="rect">
             <a:avLst/>
@@ -7462,7 +7525,7 @@
           <p:nvPr/>
         </p:nvPicPr>
         <p:blipFill>
-          <a:blip r:embed="rId2">
+          <a:blip r:embed="rId3">
             <a:extLst>
               <a:ext uri="{28A0092B-C50C-407E-A947-70E740481C1C}">
                 <a14:useLocalDpi xmlns:a14="http://schemas.microsoft.com/office/drawing/2010/main" val="0"/>
@@ -7476,7 +7539,7 @@
         <p:spPr>
           <a:xfrm>
             <a:off x="8306923" y="5009306"/>
-            <a:ext cx="325641" cy="329926"/>
+            <a:ext cx="325641" cy="329925"/>
           </a:xfrm>
           <a:prstGeom prst="rect">
             <a:avLst/>
@@ -7492,7 +7555,7 @@
           <p:nvPr/>
         </p:nvPicPr>
         <p:blipFill>
-          <a:blip r:embed="rId2">
+          <a:blip r:embed="rId3">
             <a:extLst>
               <a:ext uri="{28A0092B-C50C-407E-A947-70E740481C1C}">
                 <a14:useLocalDpi xmlns:a14="http://schemas.microsoft.com/office/drawing/2010/main" val="0"/>
@@ -7506,7 +7569,7 @@
         <p:spPr>
           <a:xfrm>
             <a:off x="8815950" y="2385612"/>
-            <a:ext cx="325641" cy="329926"/>
+            <a:ext cx="325641" cy="329925"/>
           </a:xfrm>
           <a:prstGeom prst="rect">
             <a:avLst/>
@@ -7552,7 +7615,7 @@
           <p:nvPr/>
         </p:nvPicPr>
         <p:blipFill>
-          <a:blip r:embed="rId2">
+          <a:blip r:embed="rId3">
             <a:extLst>
               <a:ext uri="{28A0092B-C50C-407E-A947-70E740481C1C}">
                 <a14:useLocalDpi xmlns:a14="http://schemas.microsoft.com/office/drawing/2010/main" val="0"/>
@@ -7566,7 +7629,7 @@
         <p:spPr>
           <a:xfrm>
             <a:off x="8815950" y="4145212"/>
-            <a:ext cx="325641" cy="329926"/>
+            <a:ext cx="325641" cy="329925"/>
           </a:xfrm>
           <a:prstGeom prst="rect">
             <a:avLst/>
@@ -7582,7 +7645,7 @@
           <p:nvPr/>
         </p:nvPicPr>
         <p:blipFill>
-          <a:blip r:embed="rId2">
+          <a:blip r:embed="rId3">
             <a:extLst>
               <a:ext uri="{28A0092B-C50C-407E-A947-70E740481C1C}">
                 <a14:useLocalDpi xmlns:a14="http://schemas.microsoft.com/office/drawing/2010/main" val="0"/>
@@ -7596,7 +7659,7 @@
         <p:spPr>
           <a:xfrm>
             <a:off x="8858565" y="5009306"/>
-            <a:ext cx="325641" cy="329926"/>
+            <a:ext cx="325641" cy="329925"/>
           </a:xfrm>
           <a:prstGeom prst="rect">
             <a:avLst/>
@@ -8022,23 +8085,25 @@
         </p:nvSpPr>
         <p:spPr/>
         <p:txBody>
-          <a:bodyPr/>
+          <a:bodyPr>
+            <a:normAutofit/>
+          </a:bodyPr>
           <a:lstStyle/>
           <a:p>
             <a:r>
-              <a:rPr lang="es-AR" dirty="0" smtClean="0"/>
+              <a:rPr lang="es-AR" sz="2800" dirty="0" smtClean="0"/>
               <a:t>Reducir tiempo de respuesta frente a accidentes</a:t>
             </a:r>
           </a:p>
           <a:p>
             <a:r>
-              <a:rPr lang="es-AR" dirty="0" smtClean="0"/>
+              <a:rPr lang="es-AR" sz="2800" dirty="0" smtClean="0"/>
               <a:t>Posición de los esquiadores en tiempo real</a:t>
             </a:r>
           </a:p>
           <a:p>
             <a:r>
-              <a:rPr lang="es-AR" dirty="0" smtClean="0"/>
+              <a:rPr lang="es-AR" sz="2800" dirty="0" smtClean="0"/>
               <a:t>Reducir accidentes y victimas fatales</a:t>
             </a:r>
           </a:p>
@@ -8093,10 +8158,24 @@
         </p:nvSpPr>
         <p:spPr/>
         <p:txBody>
-          <a:bodyPr/>
+          <a:bodyPr>
+            <a:normAutofit/>
+          </a:bodyPr>
           <a:lstStyle/>
           <a:p>
-            <a:endParaRPr lang="es-ES"/>
+            <a:r>
+              <a:rPr lang="es-AR" sz="2800" dirty="0" smtClean="0"/>
+              <a:t>Mayor seguridad</a:t>
+            </a:r>
+          </a:p>
+          <a:p>
+            <a:r>
+              <a:rPr lang="es-AR" sz="2800" dirty="0" smtClean="0"/>
+              <a:t>Mejor experiencia</a:t>
+            </a:r>
+          </a:p>
+          <a:p>
+            <a:endParaRPr lang="es-ES" sz="2800" dirty="0"/>
           </a:p>
         </p:txBody>
       </p:sp>
@@ -8160,6 +8239,82 @@
       </p:par>
     </p:tnLst>
   </p:timing>
+</p:sld>
+</file>
+
+<file path=ppt/slides/slide9.xml><?xml version="1.0" encoding="utf-8"?>
+<p:sld xmlns:a="http://schemas.openxmlformats.org/drawingml/2006/main" xmlns:r="http://schemas.openxmlformats.org/officeDocument/2006/relationships" xmlns:p="http://schemas.openxmlformats.org/presentationml/2006/main">
+  <p:cSld>
+    <p:spTree>
+      <p:nvGrpSpPr>
+        <p:cNvPr id="1" name=""/>
+        <p:cNvGrpSpPr/>
+        <p:nvPr/>
+      </p:nvGrpSpPr>
+      <p:grpSpPr>
+        <a:xfrm>
+          <a:off x="0" y="0"/>
+          <a:ext cx="0" cy="0"/>
+          <a:chOff x="0" y="0"/>
+          <a:chExt cx="0" cy="0"/>
+        </a:xfrm>
+      </p:grpSpPr>
+      <p:sp>
+        <p:nvSpPr>
+          <p:cNvPr id="2" name="Título 1"/>
+          <p:cNvSpPr>
+            <a:spLocks noGrp="1"/>
+          </p:cNvSpPr>
+          <p:nvPr>
+            <p:ph type="title"/>
+          </p:nvPr>
+        </p:nvSpPr>
+        <p:spPr/>
+        <p:txBody>
+          <a:bodyPr/>
+          <a:lstStyle/>
+          <a:p>
+            <a:endParaRPr lang="es-ES" dirty="0"/>
+          </a:p>
+        </p:txBody>
+      </p:sp>
+      <p:sp>
+        <p:nvSpPr>
+          <p:cNvPr id="3" name="Marcador de contenido 2"/>
+          <p:cNvSpPr>
+            <a:spLocks noGrp="1"/>
+          </p:cNvSpPr>
+          <p:nvPr>
+            <p:ph idx="1"/>
+          </p:nvPr>
+        </p:nvSpPr>
+        <p:spPr/>
+        <p:txBody>
+          <a:bodyPr/>
+          <a:lstStyle/>
+          <a:p>
+            <a:r>
+              <a:rPr lang="es-AR" dirty="0" smtClean="0"/>
+              <a:t>Video de </a:t>
+            </a:r>
+            <a:r>
+              <a:rPr lang="es-AR" dirty="0" err="1" smtClean="0"/>
+              <a:t>gonza</a:t>
+            </a:r>
+            <a:endParaRPr lang="es-ES" dirty="0"/>
+          </a:p>
+        </p:txBody>
+      </p:sp>
+    </p:spTree>
+    <p:extLst>
+      <p:ext uri="{BB962C8B-B14F-4D97-AF65-F5344CB8AC3E}">
+        <p14:creationId xmlns:p14="http://schemas.microsoft.com/office/powerpoint/2010/main" val="2146476824"/>
+      </p:ext>
+    </p:extLst>
+  </p:cSld>
+  <p:clrMapOvr>
+    <a:masterClrMapping/>
+  </p:clrMapOvr>
 </p:sld>
 </file>
 

</xml_diff>

<commit_message>
Corrección en el tamaño de algunos títulos
</commit_message>
<xml_diff>
--- a/Documentacion/Documentos de Gestión/Presentación comercial/PowerPoint/White Powder.pptx
+++ b/Documentacion/Documentos de Gestión/Presentación comercial/PowerPoint/White Powder.pptx
@@ -115,7 +115,7 @@
   </p:defaultTextStyle>
   <p:extLst>
     <p:ext uri="{EFAFB233-063F-42B5-8137-9DF3F51BA10A}">
-      <p15:sldGuideLst xmlns:p15="http://schemas.microsoft.com/office/powerpoint/2012/main"/>
+      <p15:sldGuideLst xmlns="" xmlns:p15="http://schemas.microsoft.com/office/powerpoint/2012/main"/>
     </p:ext>
   </p:extLst>
 </p:presentation>
@@ -6408,6 +6408,13 @@
   <p:clrMapOvr>
     <a:masterClrMapping/>
   </p:clrMapOvr>
+  <p:timing>
+    <p:tnLst>
+      <p:par>
+        <p:cTn id="1" dur="indefinite" restart="never" nodeType="tmRoot"/>
+      </p:par>
+    </p:tnLst>
+  </p:timing>
 </p:sld>
 </file>
 
@@ -7721,11 +7728,15 @@
           <a:lstStyle/>
           <a:p>
             <a:r>
+              <a:rPr lang="es-AR" sz="4400" dirty="0"/>
+              <a:t>Problemática</a:t>
+            </a:r>
+            <a:r>
               <a:rPr lang="es-AR" sz="4400" cap="small" dirty="0" smtClean="0">
                 <a:latin typeface="Levenim MT" panose="02010502060101010101" pitchFamily="2" charset="-79"/>
                 <a:cs typeface="Levenim MT" panose="02010502060101010101" pitchFamily="2" charset="-79"/>
               </a:rPr>
-              <a:t>Problemática actual</a:t>
+              <a:t> actual</a:t>
             </a:r>
             <a:endParaRPr lang="es-ES" sz="4400" cap="small" dirty="0">
               <a:latin typeface="Levenim MT" panose="02010502060101010101" pitchFamily="2" charset="-79"/>
@@ -7806,24 +7817,16 @@
         </p:nvSpPr>
         <p:spPr/>
         <p:txBody>
-          <a:bodyPr/>
+          <a:bodyPr>
+            <a:normAutofit/>
+          </a:bodyPr>
           <a:lstStyle/>
           <a:p>
             <a:r>
-              <a:rPr lang="es-AR" sz="4400" cap="small" dirty="0">
-                <a:latin typeface="Levenim MT" panose="02010502060101010101" pitchFamily="2" charset="-79"/>
-                <a:cs typeface="Levenim MT" panose="02010502060101010101" pitchFamily="2" charset="-79"/>
-              </a:rPr>
-              <a:t>Problemática</a:t>
-            </a:r>
-            <a:r>
-              <a:rPr lang="es-AR" cap="small" dirty="0">
-                <a:latin typeface="Levenim MT" panose="02010502060101010101" pitchFamily="2" charset="-79"/>
-                <a:cs typeface="Levenim MT" panose="02010502060101010101" pitchFamily="2" charset="-79"/>
-              </a:rPr>
-              <a:t> actual</a:t>
-            </a:r>
-            <a:endParaRPr lang="es-ES" dirty="0"/>
+              <a:rPr lang="es-AR" sz="4400" dirty="0"/>
+              <a:t>Problemática actual</a:t>
+            </a:r>
+            <a:endParaRPr lang="es-ES" sz="4400" dirty="0"/>
           </a:p>
         </p:txBody>
       </p:sp>
@@ -7899,6 +7902,11 @@
 <file path=ppt/slides/slide6.xml><?xml version="1.0" encoding="utf-8"?>
 <p:sld xmlns:a="http://schemas.openxmlformats.org/drawingml/2006/main" xmlns:r="http://schemas.openxmlformats.org/officeDocument/2006/relationships" xmlns:p="http://schemas.openxmlformats.org/presentationml/2006/main">
   <p:cSld>
+    <p:bg>
+      <p:bgRef idx="1003">
+        <a:schemeClr val="bg2"/>
+      </p:bgRef>
+    </p:bg>
     <p:spTree>
       <p:nvGrpSpPr>
         <p:cNvPr id="1" name=""/>
@@ -7925,17 +7933,16 @@
         </p:nvSpPr>
         <p:spPr/>
         <p:txBody>
-          <a:bodyPr/>
+          <a:bodyPr>
+            <a:normAutofit/>
+          </a:bodyPr>
           <a:lstStyle/>
           <a:p>
             <a:r>
-              <a:rPr lang="es-AR" cap="small" dirty="0">
-                <a:latin typeface="Levenim MT" panose="02010502060101010101" pitchFamily="2" charset="-79"/>
-                <a:cs typeface="Levenim MT" panose="02010502060101010101" pitchFamily="2" charset="-79"/>
-              </a:rPr>
+              <a:rPr lang="es-AR" sz="4400" dirty="0"/>
               <a:t>Problemática actual</a:t>
             </a:r>
-            <a:endParaRPr lang="es-ES" dirty="0"/>
+            <a:endParaRPr lang="es-ES" sz="4400" dirty="0"/>
           </a:p>
         </p:txBody>
       </p:sp>
@@ -7948,33 +7955,6 @@
           <p:nvPr>
             <p:ph idx="1"/>
           </p:nvPr>
-        </p:nvPicPr>
-        <p:blipFill>
-          <a:blip r:embed="rId2">
-            <a:extLst>
-              <a:ext uri="{28A0092B-C50C-407E-A947-70E740481C1C}">
-                <a14:useLocalDpi xmlns:a14="http://schemas.microsoft.com/office/drawing/2010/main" val="0"/>
-              </a:ext>
-            </a:extLst>
-          </a:blip>
-          <a:stretch>
-            <a:fillRect/>
-          </a:stretch>
-        </p:blipFill>
-        <p:spPr>
-          <a:xfrm>
-            <a:off x="2940083" y="2138784"/>
-            <a:ext cx="2880000" cy="2880000"/>
-          </a:xfrm>
-        </p:spPr>
-      </p:pic>
-      <p:pic>
-        <p:nvPicPr>
-          <p:cNvPr id="11" name="Imagen 10"/>
-          <p:cNvPicPr>
-            <a:picLocks noChangeAspect="1"/>
-          </p:cNvPicPr>
-          <p:nvPr/>
         </p:nvPicPr>
         <p:blipFill>
           <a:blip r:embed="rId3">
@@ -7990,6 +7970,33 @@
         </p:blipFill>
         <p:spPr>
           <a:xfrm>
+            <a:off x="2940083" y="2138784"/>
+            <a:ext cx="2880000" cy="2880000"/>
+          </a:xfrm>
+        </p:spPr>
+      </p:pic>
+      <p:pic>
+        <p:nvPicPr>
+          <p:cNvPr id="11" name="Imagen 10"/>
+          <p:cNvPicPr>
+            <a:picLocks noChangeAspect="1"/>
+          </p:cNvPicPr>
+          <p:nvPr/>
+        </p:nvPicPr>
+        <p:blipFill>
+          <a:blip r:embed="rId4">
+            <a:extLst>
+              <a:ext uri="{28A0092B-C50C-407E-A947-70E740481C1C}">
+                <a14:useLocalDpi xmlns:a14="http://schemas.microsoft.com/office/drawing/2010/main" val="0"/>
+              </a:ext>
+            </a:extLst>
+          </a:blip>
+          <a:stretch>
+            <a:fillRect/>
+          </a:stretch>
+        </p:blipFill>
+        <p:spPr>
+          <a:xfrm>
             <a:off x="7327371" y="2138784"/>
             <a:ext cx="2880000" cy="2880000"/>
           </a:xfrm>
@@ -8006,7 +8013,7 @@
     </p:extLst>
   </p:cSld>
   <p:clrMapOvr>
-    <a:masterClrMapping/>
+    <a:overrideClrMapping bg1="lt1" tx1="dk1" bg2="lt2" tx2="dk2" accent1="accent1" accent2="accent2" accent3="accent3" accent4="accent4" accent5="accent5" accent6="accent6" hlink="hlink" folHlink="folHlink"/>
   </p:clrMapOvr>
   <p:timing>
     <p:tnLst>
@@ -8296,6 +8303,13 @@
   <p:clrMapOvr>
     <a:masterClrMapping/>
   </p:clrMapOvr>
+  <p:timing>
+    <p:tnLst>
+      <p:par>
+        <p:cTn id="1" dur="indefinite" restart="never" nodeType="tmRoot"/>
+      </p:par>
+    </p:tnLst>
+  </p:timing>
 </p:sld>
 </file>
 
@@ -8489,8 +8503,51 @@
   <a:extraClrSchemeLst/>
   <a:extLst>
     <a:ext uri="{05A4C25C-085E-4340-85A3-A5531E510DB2}">
-      <thm15:themeFamily xmlns:thm15="http://schemas.microsoft.com/office/thememl/2012/main" name="Parallax" id="{3388167B-A2EB-4685-9635-1831D9AEF8C4}" vid="{93B4CCAC-FD5A-4D59-B1AC-EAF45910B5A9}"/>
+      <thm15:themeFamily xmlns="" xmlns:thm15="http://schemas.microsoft.com/office/thememl/2012/main" name="Parallax" id="{3388167B-A2EB-4685-9635-1831D9AEF8C4}" vid="{93B4CCAC-FD5A-4D59-B1AC-EAF45910B5A9}"/>
     </a:ext>
   </a:extLst>
 </a:theme>
+</file>
+
+<file path=ppt/theme/themeOverride1.xml><?xml version="1.0" encoding="utf-8"?>
+<a:themeOverride xmlns:a="http://schemas.openxmlformats.org/drawingml/2006/main">
+  <a:clrScheme name="Parallax">
+    <a:dk1>
+      <a:sysClr val="windowText" lastClr="000000"/>
+    </a:dk1>
+    <a:lt1>
+      <a:sysClr val="window" lastClr="FFFFFF"/>
+    </a:lt1>
+    <a:dk2>
+      <a:srgbClr val="212121"/>
+    </a:dk2>
+    <a:lt2>
+      <a:srgbClr val="CDD0D1"/>
+    </a:lt2>
+    <a:accent1>
+      <a:srgbClr val="BC1C1C"/>
+    </a:accent1>
+    <a:accent2>
+      <a:srgbClr val="F67534"/>
+    </a:accent2>
+    <a:accent3>
+      <a:srgbClr val="EAAC35"/>
+    </a:accent3>
+    <a:accent4>
+      <a:srgbClr val="9BAF68"/>
+    </a:accent4>
+    <a:accent5>
+      <a:srgbClr val="68B9A6"/>
+    </a:accent5>
+    <a:accent6>
+      <a:srgbClr val="50B1D4"/>
+    </a:accent6>
+    <a:hlink>
+      <a:srgbClr val="E46416"/>
+    </a:hlink>
+    <a:folHlink>
+      <a:srgbClr val="EE9340"/>
+    </a:folHlink>
+  </a:clrScheme>
+</a:themeOverride>
 </file>
</xml_diff>